<commit_message>
minor change on sequence diagram for search reservation
</commit_message>
<xml_diff>
--- a/docs/UML reference sheet.pptx
+++ b/docs/UML reference sheet.pptx
@@ -216,7 +216,7 @@
           <a:p>
             <a:fld id="{9629A0FB-7277-41B0-BEC2-EE35F8B0CE39}" type="datetimeFigureOut">
               <a:rPr lang="en-SG" smtClean="0"/>
-              <a:t>29/3/2020</a:t>
+              <a:t>30/3/2020</a:t>
             </a:fld>
             <a:endParaRPr lang="en-SG"/>
           </a:p>
@@ -23050,7 +23050,7 @@
         </p:nvGrpSpPr>
         <p:grpSpPr>
           <a:xfrm>
-            <a:off x="2409611" y="1447800"/>
+            <a:off x="2286000" y="1447800"/>
             <a:ext cx="440187" cy="210590"/>
             <a:chOff x="2660072" y="4394662"/>
             <a:chExt cx="276298" cy="210590"/>
@@ -23199,7 +23199,7 @@
         </p:nvSpPr>
         <p:spPr>
           <a:xfrm>
-            <a:off x="2417100" y="1235466"/>
+            <a:off x="2293489" y="1235466"/>
             <a:ext cx="236554" cy="237490"/>
           </a:xfrm>
           <a:prstGeom prst="rect">
@@ -23252,7 +23252,7 @@
         </p:nvGrpSpPr>
         <p:grpSpPr>
           <a:xfrm>
-            <a:off x="2513318" y="1031696"/>
+            <a:off x="2389707" y="1031696"/>
             <a:ext cx="276298" cy="210590"/>
             <a:chOff x="2660072" y="4394662"/>
             <a:chExt cx="276298" cy="210590"/>
@@ -23400,7 +23400,7 @@
         </p:nvSpPr>
         <p:spPr bwMode="auto">
           <a:xfrm>
-            <a:off x="2743200" y="786046"/>
+            <a:off x="2670200" y="755543"/>
             <a:ext cx="1091368" cy="784830"/>
           </a:xfrm>
           <a:prstGeom prst="rect">

</xml_diff>

<commit_message>
update on DG format and class diagram for search reservation
</commit_message>
<xml_diff>
--- a/docs/UML reference sheet.pptx
+++ b/docs/UML reference sheet.pptx
@@ -20006,8 +20006,8 @@
         </p:nvSpPr>
         <p:spPr>
           <a:xfrm>
-            <a:off x="0" y="685800"/>
-            <a:ext cx="1305698" cy="707886"/>
+            <a:off x="-304797" y="1806887"/>
+            <a:ext cx="1580797" cy="323165"/>
           </a:xfrm>
           <a:prstGeom prst="rect">
             <a:avLst/>
@@ -20038,7 +20038,7 @@
               <a:defRPr/>
             </a:pPr>
             <a:r>
-              <a:rPr lang="en-US" altLang="zh-CN" sz="2000" kern="0" dirty="0" err="1">
+              <a:rPr lang="en-US" altLang="zh-CN" sz="1500" kern="0" dirty="0" err="1">
                 <a:solidFill>
                   <a:sysClr val="windowText" lastClr="000000"/>
                 </a:solidFill>
@@ -20047,7 +20047,7 @@
               </a:rPr>
               <a:t>CommandParser</a:t>
             </a:r>
-            <a:endParaRPr lang="en-US" sz="2000" kern="0" dirty="0">
+            <a:endParaRPr lang="en-US" sz="1500" kern="0" dirty="0">
               <a:solidFill>
                 <a:sysClr val="windowText" lastClr="000000"/>
               </a:solidFill>
@@ -20066,13 +20066,14 @@
           </p:cNvPr>
           <p:cNvCxnSpPr>
             <a:cxnSpLocks/>
+            <a:stCxn id="10" idx="1"/>
           </p:cNvCxnSpPr>
           <p:nvPr/>
         </p:nvCxnSpPr>
         <p:spPr>
           <a:xfrm rot="10800000">
-            <a:off x="1275843" y="1002895"/>
-            <a:ext cx="394836" cy="16110"/>
+            <a:off x="1276865" y="1936308"/>
+            <a:ext cx="263691" cy="203926"/>
           </a:xfrm>
           <a:prstGeom prst="bentConnector3">
             <a:avLst>
@@ -20105,8 +20106,8 @@
         </p:nvSpPr>
         <p:spPr>
           <a:xfrm>
-            <a:off x="1508739" y="395246"/>
-            <a:ext cx="5500657" cy="400110"/>
+            <a:off x="1540555" y="1978651"/>
+            <a:ext cx="5500657" cy="323165"/>
           </a:xfrm>
           <a:prstGeom prst="rect">
             <a:avLst/>
@@ -20135,7 +20136,7 @@
           <a:p>
             <a:pPr algn="ctr" defTabSz="872733"/>
             <a:r>
-              <a:rPr lang="en-US" altLang="zh-CN" sz="2000" dirty="0" err="1">
+              <a:rPr lang="en-US" altLang="zh-CN" sz="1500" dirty="0" err="1">
                 <a:solidFill>
                   <a:prstClr val="black"/>
                 </a:solidFill>
@@ -20144,7 +20145,7 @@
               </a:rPr>
               <a:t>SearchReservationCommand</a:t>
             </a:r>
-            <a:endParaRPr lang="en-US" altLang="zh-CN" sz="2000" dirty="0">
+            <a:endParaRPr lang="en-US" altLang="zh-CN" sz="1500" dirty="0">
               <a:solidFill>
                 <a:prstClr val="black"/>
               </a:solidFill>
@@ -20168,8 +20169,8 @@
         </p:nvSpPr>
         <p:spPr>
           <a:xfrm>
-            <a:off x="1508738" y="799228"/>
-            <a:ext cx="5500676" cy="1015663"/>
+            <a:off x="1540554" y="2287814"/>
+            <a:ext cx="5500676" cy="784830"/>
           </a:xfrm>
           <a:prstGeom prst="rect">
             <a:avLst/>
@@ -20198,7 +20199,7 @@
           <a:p>
             <a:pPr defTabSz="872733"/>
             <a:r>
-              <a:rPr lang="en-US" altLang="zh-CN" sz="2000" dirty="0">
+              <a:rPr lang="en-US" altLang="zh-CN" sz="1500" dirty="0">
                 <a:solidFill>
                   <a:prstClr val="black"/>
                 </a:solidFill>
@@ -20208,7 +20209,7 @@
               <a:t>- </a:t>
             </a:r>
             <a:r>
-              <a:rPr lang="en-US" altLang="zh-CN" sz="2000" dirty="0" err="1">
+              <a:rPr lang="en-US" altLang="zh-CN" sz="1500" dirty="0" err="1">
                 <a:solidFill>
                   <a:prstClr val="black"/>
                 </a:solidFill>
@@ -20218,7 +20219,7 @@
               <a:t>reservationNumber</a:t>
             </a:r>
             <a:r>
-              <a:rPr lang="en-US" altLang="zh-CN" sz="2000" dirty="0">
+              <a:rPr lang="en-US" altLang="zh-CN" sz="1500" dirty="0">
                 <a:solidFill>
                   <a:prstClr val="black"/>
                 </a:solidFill>
@@ -20231,7 +20232,7 @@
           <a:p>
             <a:pPr defTabSz="872733"/>
             <a:r>
-              <a:rPr lang="en-US" altLang="zh-CN" sz="2000" dirty="0">
+              <a:rPr lang="en-US" altLang="zh-CN" sz="1500" dirty="0">
                 <a:solidFill>
                   <a:prstClr val="black"/>
                 </a:solidFill>
@@ -20241,7 +20242,7 @@
               <a:t>- date: </a:t>
             </a:r>
             <a:r>
-              <a:rPr lang="en-US" altLang="zh-CN" sz="2000" dirty="0" err="1">
+              <a:rPr lang="en-US" altLang="zh-CN" sz="1500" dirty="0" err="1">
                 <a:solidFill>
                   <a:prstClr val="black"/>
                 </a:solidFill>
@@ -20250,7 +20251,7 @@
               </a:rPr>
               <a:t>LocalDate</a:t>
             </a:r>
-            <a:endParaRPr lang="en-US" altLang="zh-CN" sz="2000" dirty="0">
+            <a:endParaRPr lang="en-US" altLang="zh-CN" sz="1500" dirty="0">
               <a:solidFill>
                 <a:prstClr val="black"/>
               </a:solidFill>
@@ -20261,7 +20262,7 @@
           <a:p>
             <a:pPr defTabSz="872733"/>
             <a:r>
-              <a:rPr lang="en-US" altLang="zh-CN" sz="2000" dirty="0">
+              <a:rPr lang="en-US" altLang="zh-CN" sz="1500" dirty="0">
                 <a:solidFill>
                   <a:prstClr val="black"/>
                 </a:solidFill>
@@ -20270,7 +20271,7 @@
               </a:rPr>
               <a:t>- description: String</a:t>
             </a:r>
-            <a:endParaRPr lang="en-US" altLang="zh-CN" sz="2000" u="sng" dirty="0">
+            <a:endParaRPr lang="en-US" altLang="zh-CN" sz="1500" u="sng" dirty="0">
               <a:solidFill>
                 <a:prstClr val="black"/>
               </a:solidFill>
@@ -20294,8 +20295,8 @@
         </p:nvSpPr>
         <p:spPr>
           <a:xfrm>
-            <a:off x="1508739" y="1820147"/>
-            <a:ext cx="5500677" cy="1015663"/>
+            <a:off x="1540555" y="3063816"/>
+            <a:ext cx="5500677" cy="784830"/>
           </a:xfrm>
           <a:prstGeom prst="rect">
             <a:avLst/>
@@ -20324,7 +20325,7 @@
           <a:p>
             <a:pPr defTabSz="872733"/>
             <a:r>
-              <a:rPr lang="en-US" altLang="zh-CN" sz="2000" dirty="0">
+              <a:rPr lang="en-US" altLang="zh-CN" sz="1500" dirty="0">
                 <a:solidFill>
                   <a:prstClr val="black"/>
                 </a:solidFill>
@@ -20334,7 +20335,7 @@
               <a:t>+ </a:t>
             </a:r>
             <a:r>
-              <a:rPr lang="en-US" altLang="zh-CN" sz="2000" dirty="0" err="1">
+              <a:rPr lang="en-US" altLang="zh-CN" sz="1500" dirty="0" err="1">
                 <a:solidFill>
                   <a:prstClr val="black"/>
                 </a:solidFill>
@@ -20344,7 +20345,7 @@
               <a:t>SearchReservationCommand</a:t>
             </a:r>
             <a:r>
-              <a:rPr lang="en-US" altLang="zh-CN" sz="2000" dirty="0">
+              <a:rPr lang="en-US" altLang="zh-CN" sz="1500" dirty="0">
                 <a:solidFill>
                   <a:prstClr val="black"/>
                 </a:solidFill>
@@ -20357,7 +20358,7 @@
           <a:p>
             <a:pPr defTabSz="872733"/>
             <a:r>
-              <a:rPr lang="en-US" altLang="zh-CN" sz="2000" dirty="0">
+              <a:rPr lang="en-US" altLang="zh-CN" sz="1500" dirty="0">
                 <a:solidFill>
                   <a:prstClr val="black"/>
                 </a:solidFill>
@@ -20367,7 +20368,7 @@
               <a:t>+ execute(reservations: </a:t>
             </a:r>
             <a:r>
-              <a:rPr lang="en-US" altLang="zh-CN" sz="2000" dirty="0" err="1">
+              <a:rPr lang="en-US" altLang="zh-CN" sz="1500" dirty="0" err="1">
                 <a:solidFill>
                   <a:prstClr val="black"/>
                 </a:solidFill>
@@ -20377,7 +20378,7 @@
               <a:t>ReservationList</a:t>
             </a:r>
             <a:r>
-              <a:rPr lang="en-US" altLang="zh-CN" sz="2000" dirty="0">
+              <a:rPr lang="en-US" altLang="zh-CN" sz="1500" dirty="0">
                 <a:solidFill>
                   <a:prstClr val="black"/>
                 </a:solidFill>
@@ -20387,7 +20388,7 @@
               <a:t>, </a:t>
             </a:r>
             <a:r>
-              <a:rPr lang="en-US" altLang="zh-CN" sz="2000" dirty="0" err="1">
+              <a:rPr lang="en-US" altLang="zh-CN" sz="1500" dirty="0" err="1">
                 <a:solidFill>
                   <a:prstClr val="black"/>
                 </a:solidFill>
@@ -20397,7 +20398,7 @@
               <a:t>ui</a:t>
             </a:r>
             <a:r>
-              <a:rPr lang="en-US" altLang="zh-CN" sz="2000" dirty="0">
+              <a:rPr lang="en-US" altLang="zh-CN" sz="1500" dirty="0">
                 <a:solidFill>
                   <a:prstClr val="black"/>
                 </a:solidFill>
@@ -20410,17 +20411,17 @@
           <a:p>
             <a:pPr defTabSz="872733"/>
             <a:r>
-              <a:rPr lang="en-US" altLang="zh-CN" sz="2000" dirty="0">
+              <a:rPr lang="en-US" altLang="zh-CN" sz="1500" dirty="0">
                 <a:solidFill>
                   <a:prstClr val="black"/>
                 </a:solidFill>
                 <a:latin typeface="Calibri" panose="020F0502020204030204" pitchFamily="34" charset="0"/>
                 <a:cs typeface="Calibri" panose="020F0502020204030204" pitchFamily="34" charset="0"/>
               </a:rPr>
-              <a:t>+ </a:t>
-            </a:r>
-            <a:r>
-              <a:rPr lang="en-US" altLang="zh-CN" sz="2000" dirty="0" err="1">
+              <a:t># </a:t>
+            </a:r>
+            <a:r>
+              <a:rPr lang="en-US" altLang="zh-CN" sz="1500" dirty="0" err="1">
                 <a:solidFill>
                   <a:prstClr val="black"/>
                 </a:solidFill>
@@ -20430,7 +20431,7 @@
               <a:t>parseInput</a:t>
             </a:r>
             <a:r>
-              <a:rPr lang="en-US" altLang="zh-CN" sz="2000" dirty="0">
+              <a:rPr lang="en-US" altLang="zh-CN" sz="1500" dirty="0">
                 <a:solidFill>
                   <a:prstClr val="black"/>
                 </a:solidFill>
@@ -20458,7 +20459,7 @@
         </p:nvCxnSpPr>
         <p:spPr>
           <a:xfrm>
-            <a:off x="3798029" y="1082442"/>
+            <a:off x="3829845" y="2455612"/>
             <a:ext cx="0" cy="0"/>
           </a:xfrm>
           <a:prstGeom prst="line">
@@ -20499,8 +20500,8 @@
         </p:nvSpPr>
         <p:spPr>
           <a:xfrm>
-            <a:off x="7272233" y="395246"/>
-            <a:ext cx="1890598" cy="400110"/>
+            <a:off x="7304048" y="1806888"/>
+            <a:ext cx="3623509" cy="323165"/>
           </a:xfrm>
           <a:prstGeom prst="rect">
             <a:avLst/>
@@ -20555,7 +20556,7 @@
               <a:defRPr/>
             </a:pPr>
             <a:r>
-              <a:rPr lang="en-US" sz="2000" kern="0" dirty="0">
+              <a:rPr lang="en-US" sz="1500" kern="0" dirty="0">
                 <a:solidFill>
                   <a:sysClr val="windowText" lastClr="000000"/>
                 </a:solidFill>
@@ -20582,9 +20583,9 @@
           <p:nvPr/>
         </p:nvCxnSpPr>
         <p:spPr>
-          <a:xfrm rot="10800000">
-            <a:off x="7009397" y="595301"/>
-            <a:ext cx="262839" cy="12700"/>
+          <a:xfrm rot="10800000" flipV="1">
+            <a:off x="7041212" y="1968470"/>
+            <a:ext cx="262836" cy="171763"/>
           </a:xfrm>
           <a:prstGeom prst="bentConnector3">
             <a:avLst>
@@ -20617,8 +20618,8 @@
         </p:nvSpPr>
         <p:spPr>
           <a:xfrm>
-            <a:off x="7273091" y="758908"/>
-            <a:ext cx="1890603" cy="1015663"/>
+            <a:off x="7304048" y="2128868"/>
+            <a:ext cx="3623510" cy="323165"/>
           </a:xfrm>
           <a:prstGeom prst="rect">
             <a:avLst/>
@@ -20673,7 +20674,7 @@
               <a:defRPr/>
             </a:pPr>
             <a:r>
-              <a:rPr lang="en-US" sz="2000" kern="0" dirty="0">
+              <a:rPr lang="en-US" sz="1500" kern="0" dirty="0">
                 <a:solidFill>
                   <a:sysClr val="windowText" lastClr="000000"/>
                 </a:solidFill>
@@ -20681,7 +20682,7 @@
               <a:t>+ </a:t>
             </a:r>
             <a:r>
-              <a:rPr lang="en-US" sz="2000" kern="0" dirty="0" err="1">
+              <a:rPr lang="en-US" sz="1500" kern="0" dirty="0" err="1">
                 <a:solidFill>
                   <a:sysClr val="windowText" lastClr="000000"/>
                 </a:solidFill>
@@ -20689,7 +20690,7 @@
               <a:t>showMessage</a:t>
             </a:r>
             <a:r>
-              <a:rPr lang="en-US" sz="2000" kern="0" dirty="0">
+              <a:rPr lang="en-US" sz="1500" kern="0" dirty="0">
                 <a:solidFill>
                   <a:sysClr val="windowText" lastClr="000000"/>
                 </a:solidFill>
@@ -20713,8 +20714,8 @@
         </p:nvSpPr>
         <p:spPr>
           <a:xfrm>
-            <a:off x="1784768" y="3140712"/>
-            <a:ext cx="4248538" cy="400110"/>
+            <a:off x="1833300" y="4180006"/>
+            <a:ext cx="4248538" cy="323165"/>
           </a:xfrm>
           <a:prstGeom prst="rect">
             <a:avLst/>
@@ -20745,14 +20746,14 @@
               <a:defRPr/>
             </a:pPr>
             <a:r>
-              <a:rPr lang="en-US" sz="2000" kern="0" dirty="0" err="1">
+              <a:rPr lang="en-US" sz="1500" kern="0" dirty="0" err="1">
                 <a:solidFill>
                   <a:sysClr val="windowText" lastClr="000000"/>
                 </a:solidFill>
               </a:rPr>
               <a:t>ReservationList</a:t>
             </a:r>
-            <a:endParaRPr lang="en-US" sz="2000" kern="0" dirty="0">
+            <a:endParaRPr lang="en-US" sz="1500" kern="0" dirty="0">
               <a:solidFill>
                 <a:sysClr val="windowText" lastClr="000000"/>
               </a:solidFill>
@@ -20774,8 +20775,8 @@
         </p:nvSpPr>
         <p:spPr>
           <a:xfrm>
-            <a:off x="1784769" y="3531849"/>
-            <a:ext cx="4248537" cy="707886"/>
+            <a:off x="1833301" y="4499882"/>
+            <a:ext cx="4248537" cy="323165"/>
           </a:xfrm>
           <a:prstGeom prst="rect">
             <a:avLst/>
@@ -20806,7 +20807,7 @@
               <a:defRPr/>
             </a:pPr>
             <a:r>
-              <a:rPr lang="en-US" sz="2000" kern="0" dirty="0">
+              <a:rPr lang="en-US" sz="1500" kern="0" dirty="0">
                 <a:solidFill>
                   <a:sysClr val="windowText" lastClr="000000"/>
                 </a:solidFill>
@@ -20814,7 +20815,7 @@
               <a:t>+ </a:t>
             </a:r>
             <a:r>
-              <a:rPr lang="en-US" sz="2000" kern="0" dirty="0" err="1">
+              <a:rPr lang="en-US" sz="1500" kern="0" dirty="0" err="1">
                 <a:solidFill>
                   <a:sysClr val="windowText" lastClr="000000"/>
                 </a:solidFill>
@@ -20822,7 +20823,7 @@
               <a:t>getReservation</a:t>
             </a:r>
             <a:r>
-              <a:rPr lang="en-US" sz="2000" kern="0" dirty="0">
+              <a:rPr lang="en-US" sz="1500" kern="0" dirty="0">
                 <a:solidFill>
                   <a:sysClr val="windowText" lastClr="000000"/>
                 </a:solidFill>
@@ -20830,7 +20831,7 @@
               <a:t>(</a:t>
             </a:r>
             <a:r>
-              <a:rPr lang="en-US" sz="2000" kern="0" dirty="0" err="1">
+              <a:rPr lang="en-US" sz="1500" kern="0" dirty="0" err="1">
                 <a:solidFill>
                   <a:sysClr val="windowText" lastClr="000000"/>
                 </a:solidFill>
@@ -20838,7 +20839,7 @@
               <a:t>reservationNumber</a:t>
             </a:r>
             <a:r>
-              <a:rPr lang="en-US" sz="2000" kern="0" dirty="0">
+              <a:rPr lang="en-US" sz="1500" kern="0" dirty="0">
                 <a:solidFill>
                   <a:sysClr val="windowText" lastClr="000000"/>
                 </a:solidFill>
@@ -20864,7 +20865,7 @@
         </p:nvCxnSpPr>
         <p:spPr>
           <a:xfrm>
-            <a:off x="3928594" y="2825862"/>
+            <a:off x="3957569" y="3875206"/>
             <a:ext cx="0" cy="304800"/>
           </a:xfrm>
           <a:prstGeom prst="straightConnector1">
@@ -20907,7 +20908,7 @@
         </p:nvSpPr>
         <p:spPr>
           <a:xfrm>
-            <a:off x="3813845" y="4256920"/>
+            <a:off x="3845661" y="4846658"/>
             <a:ext cx="228600" cy="228600"/>
           </a:xfrm>
           <a:prstGeom prst="flowChartDecision">
@@ -20943,7 +20944,7 @@
           <a:lstStyle/>
           <a:p>
             <a:pPr algn="ctr" defTabSz="872733"/>
-            <a:endParaRPr lang="en-US" sz="2000">
+            <a:endParaRPr lang="en-US" sz="1500">
               <a:solidFill>
                 <a:prstClr val="white"/>
               </a:solidFill>
@@ -20965,8 +20966,8 @@
         </p:nvSpPr>
         <p:spPr>
           <a:xfrm>
-            <a:off x="1807041" y="4823817"/>
-            <a:ext cx="4248538" cy="400110"/>
+            <a:off x="1866842" y="5414093"/>
+            <a:ext cx="4258811" cy="321455"/>
           </a:xfrm>
           <a:prstGeom prst="rect">
             <a:avLst/>
@@ -20997,7 +20998,7 @@
               <a:defRPr/>
             </a:pPr>
             <a:r>
-              <a:rPr lang="en-US" altLang="zh-CN" sz="2000" kern="0" dirty="0">
+              <a:rPr lang="en-US" altLang="zh-CN" sz="1500" kern="0" dirty="0">
                 <a:solidFill>
                   <a:sysClr val="windowText" lastClr="000000"/>
                 </a:solidFill>
@@ -21006,7 +21007,7 @@
               </a:rPr>
               <a:t>Reservation</a:t>
             </a:r>
-            <a:endParaRPr lang="en-US" sz="2000" kern="0" dirty="0">
+            <a:endParaRPr lang="en-US" sz="1500" kern="0" dirty="0">
               <a:solidFill>
                 <a:sysClr val="windowText" lastClr="000000"/>
               </a:solidFill>
@@ -21028,8 +21029,8 @@
         </p:nvSpPr>
         <p:spPr>
           <a:xfrm>
-            <a:off x="1807041" y="5927271"/>
-            <a:ext cx="4259654" cy="707886"/>
+            <a:off x="1866843" y="6284495"/>
+            <a:ext cx="4259654" cy="553998"/>
           </a:xfrm>
           <a:prstGeom prst="rect">
             <a:avLst/>
@@ -21060,7 +21061,7 @@
               <a:defRPr/>
             </a:pPr>
             <a:r>
-              <a:rPr lang="en-US" altLang="zh-CN" sz="2000" kern="0" dirty="0">
+              <a:rPr lang="en-US" altLang="zh-CN" sz="1500" kern="0" dirty="0">
                 <a:solidFill>
                   <a:sysClr val="windowText" lastClr="000000"/>
                 </a:solidFill>
@@ -21070,7 +21071,7 @@
               <a:t>+ </a:t>
             </a:r>
             <a:r>
-              <a:rPr lang="en-US" altLang="zh-CN" sz="2000" kern="0" dirty="0" err="1">
+              <a:rPr lang="en-US" altLang="zh-CN" sz="1500" kern="0" dirty="0" err="1">
                 <a:solidFill>
                   <a:sysClr val="windowText" lastClr="000000"/>
                 </a:solidFill>
@@ -21080,7 +21081,7 @@
               <a:t>getDate</a:t>
             </a:r>
             <a:r>
-              <a:rPr lang="en-US" altLang="zh-CN" sz="2000" kern="0" dirty="0">
+              <a:rPr lang="en-US" altLang="zh-CN" sz="1500" kern="0" dirty="0">
                 <a:solidFill>
                   <a:sysClr val="windowText" lastClr="000000"/>
                 </a:solidFill>
@@ -21090,7 +21091,7 @@
               <a:t>(): </a:t>
             </a:r>
             <a:r>
-              <a:rPr lang="en-US" altLang="zh-CN" sz="2000" kern="0" dirty="0" err="1">
+              <a:rPr lang="en-US" altLang="zh-CN" sz="1500" kern="0" dirty="0" err="1">
                 <a:solidFill>
                   <a:sysClr val="windowText" lastClr="000000"/>
                 </a:solidFill>
@@ -21099,7 +21100,7 @@
               </a:rPr>
               <a:t>LocalDateTime</a:t>
             </a:r>
-            <a:endParaRPr lang="en-US" altLang="zh-CN" sz="2000" kern="0" dirty="0">
+            <a:endParaRPr lang="en-US" altLang="zh-CN" sz="1500" kern="0" dirty="0">
               <a:solidFill>
                 <a:sysClr val="windowText" lastClr="000000"/>
               </a:solidFill>
@@ -21112,7 +21113,7 @@
               <a:defRPr/>
             </a:pPr>
             <a:r>
-              <a:rPr lang="en-US" sz="2000" kern="0" dirty="0">
+              <a:rPr lang="en-US" sz="1500" kern="0" dirty="0">
                 <a:solidFill>
                   <a:sysClr val="windowText" lastClr="000000"/>
                 </a:solidFill>
@@ -21122,7 +21123,7 @@
               <a:t>+ </a:t>
             </a:r>
             <a:r>
-              <a:rPr lang="en-US" sz="2000" kern="0" dirty="0" err="1">
+              <a:rPr lang="en-US" sz="1500" kern="0" dirty="0" err="1">
                 <a:solidFill>
                   <a:sysClr val="windowText" lastClr="000000"/>
                 </a:solidFill>
@@ -21132,7 +21133,7 @@
               <a:t>getReservationNumber</a:t>
             </a:r>
             <a:r>
-              <a:rPr lang="en-US" sz="2000" kern="0" dirty="0">
+              <a:rPr lang="en-US" sz="1500" kern="0" dirty="0">
                 <a:solidFill>
                   <a:sysClr val="windowText" lastClr="000000"/>
                 </a:solidFill>
@@ -21141,7 +21142,7 @@
               </a:rPr>
               <a:t>(): Integer</a:t>
             </a:r>
-            <a:endParaRPr lang="en-US" sz="2000" kern="0" dirty="0">
+            <a:endParaRPr lang="en-US" sz="1500" kern="0" dirty="0">
               <a:solidFill>
                 <a:sysClr val="windowText" lastClr="000000"/>
               </a:solidFill>
@@ -21163,8 +21164,8 @@
         </p:nvSpPr>
         <p:spPr>
           <a:xfrm>
-            <a:off x="1795926" y="5213528"/>
-            <a:ext cx="4259655" cy="707886"/>
+            <a:off x="1866002" y="5735548"/>
+            <a:ext cx="4259655" cy="553998"/>
           </a:xfrm>
           <a:prstGeom prst="rect">
             <a:avLst/>
@@ -21195,7 +21196,7 @@
               <a:defRPr/>
             </a:pPr>
             <a:r>
-              <a:rPr lang="en-US" altLang="zh-CN" sz="2000" kern="0" dirty="0">
+              <a:rPr lang="en-US" altLang="zh-CN" sz="1500" kern="0" dirty="0">
                 <a:solidFill>
                   <a:sysClr val="windowText" lastClr="000000"/>
                 </a:solidFill>
@@ -21205,7 +21206,7 @@
               <a:t>- </a:t>
             </a:r>
             <a:r>
-              <a:rPr lang="en-US" altLang="zh-CN" sz="2000" kern="0" dirty="0" err="1">
+              <a:rPr lang="en-US" altLang="zh-CN" sz="1500" kern="0" dirty="0" err="1">
                 <a:solidFill>
                   <a:sysClr val="windowText" lastClr="000000"/>
                 </a:solidFill>
@@ -21215,7 +21216,7 @@
               <a:t>reservationNumber</a:t>
             </a:r>
             <a:r>
-              <a:rPr lang="en-US" altLang="zh-CN" sz="2000" kern="0" dirty="0">
+              <a:rPr lang="en-US" altLang="zh-CN" sz="1500" kern="0" dirty="0">
                 <a:solidFill>
                   <a:sysClr val="windowText" lastClr="000000"/>
                 </a:solidFill>
@@ -21230,7 +21231,7 @@
               <a:defRPr/>
             </a:pPr>
             <a:r>
-              <a:rPr lang="en-US" sz="2000" kern="0" dirty="0">
+              <a:rPr lang="en-US" sz="1500" kern="0" dirty="0">
                 <a:solidFill>
                   <a:sysClr val="windowText" lastClr="000000"/>
                 </a:solidFill>
@@ -21240,7 +21241,7 @@
               <a:t>- date: </a:t>
             </a:r>
             <a:r>
-              <a:rPr lang="en-US" sz="2000" kern="0" dirty="0" err="1">
+              <a:rPr lang="en-US" sz="1500" kern="0" dirty="0" err="1">
                 <a:solidFill>
                   <a:sysClr val="windowText" lastClr="000000"/>
                 </a:solidFill>
@@ -21249,7 +21250,7 @@
               </a:rPr>
               <a:t>LocalDateTime</a:t>
             </a:r>
-            <a:endParaRPr lang="en-US" sz="2000" kern="0" dirty="0">
+            <a:endParaRPr lang="en-US" sz="1500" kern="0" dirty="0">
               <a:solidFill>
                 <a:sysClr val="windowText" lastClr="000000"/>
               </a:solidFill>
@@ -21274,7 +21275,7 @@
         </p:nvCxnSpPr>
         <p:spPr>
           <a:xfrm>
-            <a:off x="3928145" y="4485520"/>
+            <a:off x="3959961" y="5075258"/>
             <a:ext cx="0" cy="312556"/>
           </a:xfrm>
           <a:prstGeom prst="straightConnector1">
@@ -21316,8 +21317,8 @@
         </p:nvSpPr>
         <p:spPr>
           <a:xfrm>
-            <a:off x="3925753" y="4529454"/>
-            <a:ext cx="729757" cy="369332"/>
+            <a:off x="3957569" y="5119192"/>
+            <a:ext cx="729757" cy="323165"/>
           </a:xfrm>
           <a:prstGeom prst="rect">
             <a:avLst/>
@@ -21331,10 +21332,511 @@
           <a:lstStyle/>
           <a:p>
             <a:r>
-              <a:rPr lang="en-US" altLang="zh-CN" dirty="0"/>
+              <a:rPr lang="en-US" altLang="zh-CN" sz="1500" dirty="0"/>
               <a:t>*</a:t>
             </a:r>
-            <a:endParaRPr lang="zh-CN" altLang="en-US" dirty="0"/>
+            <a:endParaRPr lang="zh-CN" altLang="en-US" sz="1500" dirty="0"/>
+          </a:p>
+        </p:txBody>
+      </p:sp>
+      <p:sp>
+        <p:nvSpPr>
+          <p:cNvPr id="21" name="文本框 20">
+            <a:extLst>
+              <a:ext uri="{FF2B5EF4-FFF2-40B4-BE49-F238E27FC236}">
+                <a16:creationId xmlns:a16="http://schemas.microsoft.com/office/drawing/2014/main" id="{9ED44FF4-1B73-4331-8EFE-DE15201AB0A3}"/>
+              </a:ext>
+            </a:extLst>
+          </p:cNvPr>
+          <p:cNvSpPr txBox="1"/>
+          <p:nvPr/>
+        </p:nvSpPr>
+        <p:spPr>
+          <a:xfrm>
+            <a:off x="1276000" y="2145954"/>
+            <a:ext cx="729757" cy="323165"/>
+          </a:xfrm>
+          <a:prstGeom prst="rect">
+            <a:avLst/>
+          </a:prstGeom>
+          <a:noFill/>
+        </p:spPr>
+        <p:txBody>
+          <a:bodyPr wrap="square" rtlCol="0">
+            <a:spAutoFit/>
+          </a:bodyPr>
+          <a:lstStyle/>
+          <a:p>
+            <a:r>
+              <a:rPr lang="en-US" altLang="zh-CN" sz="1500" dirty="0"/>
+              <a:t>*</a:t>
+            </a:r>
+            <a:endParaRPr lang="zh-CN" altLang="en-US" sz="1500" dirty="0"/>
+          </a:p>
+        </p:txBody>
+      </p:sp>
+      <p:sp>
+        <p:nvSpPr>
+          <p:cNvPr id="28" name="Rectangle 86">
+            <a:extLst>
+              <a:ext uri="{FF2B5EF4-FFF2-40B4-BE49-F238E27FC236}">
+                <a16:creationId xmlns:a16="http://schemas.microsoft.com/office/drawing/2014/main" id="{5AA0412C-E7B3-4A6D-90B9-942EF20910F5}"/>
+              </a:ext>
+            </a:extLst>
+          </p:cNvPr>
+          <p:cNvSpPr/>
+          <p:nvPr/>
+        </p:nvSpPr>
+        <p:spPr>
+          <a:xfrm>
+            <a:off x="1653691" y="44041"/>
+            <a:ext cx="4841139" cy="553998"/>
+          </a:xfrm>
+          <a:prstGeom prst="rect">
+            <a:avLst/>
+          </a:prstGeom>
+          <a:gradFill rotWithShape="1">
+            <a:gsLst>
+              <a:gs pos="0">
+                <a:srgbClr val="4F81BD">
+                  <a:tint val="50000"/>
+                  <a:satMod val="300000"/>
+                </a:srgbClr>
+              </a:gs>
+              <a:gs pos="35000">
+                <a:srgbClr val="4F81BD">
+                  <a:tint val="37000"/>
+                  <a:satMod val="300000"/>
+                </a:srgbClr>
+              </a:gs>
+              <a:gs pos="100000">
+                <a:srgbClr val="4F81BD">
+                  <a:tint val="15000"/>
+                  <a:satMod val="350000"/>
+                </a:srgbClr>
+              </a:gs>
+            </a:gsLst>
+            <a:lin ang="16200000" scaled="1"/>
+          </a:gradFill>
+          <a:ln w="19050" cap="flat" cmpd="sng" algn="ctr">
+            <a:solidFill>
+              <a:srgbClr val="4F81BD">
+                <a:shade val="95000"/>
+                <a:satMod val="105000"/>
+              </a:srgbClr>
+            </a:solidFill>
+            <a:prstDash val="solid"/>
+          </a:ln>
+          <a:effectLst>
+            <a:outerShdw blurRad="40000" dist="20000" dir="5400000" rotWithShape="0">
+              <a:srgbClr val="000000">
+                <a:alpha val="38000"/>
+              </a:srgbClr>
+            </a:outerShdw>
+          </a:effectLst>
+        </p:spPr>
+        <p:txBody>
+          <a:bodyPr wrap="square" rtlCol="0" anchor="ctr">
+            <a:spAutoFit/>
+          </a:bodyPr>
+          <a:lstStyle/>
+          <a:p>
+            <a:pPr algn="ctr">
+              <a:defRPr/>
+            </a:pPr>
+            <a:r>
+              <a:rPr lang="en-US" sz="1500" kern="0" dirty="0">
+                <a:solidFill>
+                  <a:sysClr val="windowText" lastClr="000000"/>
+                </a:solidFill>
+              </a:rPr>
+              <a:t>{abstract}</a:t>
+            </a:r>
+          </a:p>
+          <a:p>
+            <a:pPr algn="ctr">
+              <a:defRPr/>
+            </a:pPr>
+            <a:r>
+              <a:rPr lang="en-US" sz="1500" kern="0" dirty="0" err="1">
+                <a:solidFill>
+                  <a:sysClr val="windowText" lastClr="000000"/>
+                </a:solidFill>
+              </a:rPr>
+              <a:t>R</a:t>
+            </a:r>
+            <a:r>
+              <a:rPr lang="en-US" altLang="zh-CN" sz="1500" kern="0" dirty="0" err="1">
+                <a:solidFill>
+                  <a:sysClr val="windowText" lastClr="000000"/>
+                </a:solidFill>
+              </a:rPr>
+              <a:t>eservationCommand</a:t>
+            </a:r>
+            <a:endParaRPr lang="en-US" sz="1500" kern="0" dirty="0">
+              <a:solidFill>
+                <a:sysClr val="windowText" lastClr="000000"/>
+              </a:solidFill>
+            </a:endParaRPr>
+          </a:p>
+        </p:txBody>
+      </p:sp>
+      <p:sp>
+        <p:nvSpPr>
+          <p:cNvPr id="29" name="Isosceles Triangle 89">
+            <a:extLst>
+              <a:ext uri="{FF2B5EF4-FFF2-40B4-BE49-F238E27FC236}">
+                <a16:creationId xmlns:a16="http://schemas.microsoft.com/office/drawing/2014/main" id="{3D5FF838-4C50-4F68-A023-00C4C88D0ADB}"/>
+              </a:ext>
+            </a:extLst>
+          </p:cNvPr>
+          <p:cNvSpPr/>
+          <p:nvPr/>
+        </p:nvSpPr>
+        <p:spPr>
+          <a:xfrm>
+            <a:off x="3966987" y="1616580"/>
+            <a:ext cx="228600" cy="152400"/>
+          </a:xfrm>
+          <a:prstGeom prst="triangle">
+            <a:avLst/>
+          </a:prstGeom>
+          <a:solidFill>
+            <a:schemeClr val="bg1"/>
+          </a:solidFill>
+          <a:ln w="19050">
+            <a:solidFill>
+              <a:srgbClr val="FF0000"/>
+            </a:solidFill>
+          </a:ln>
+        </p:spPr>
+        <p:style>
+          <a:lnRef idx="2">
+            <a:schemeClr val="accent1">
+              <a:shade val="50000"/>
+            </a:schemeClr>
+          </a:lnRef>
+          <a:fillRef idx="1">
+            <a:schemeClr val="accent1"/>
+          </a:fillRef>
+          <a:effectRef idx="0">
+            <a:schemeClr val="accent1"/>
+          </a:effectRef>
+          <a:fontRef idx="minor">
+            <a:schemeClr val="lt1"/>
+          </a:fontRef>
+        </p:style>
+        <p:txBody>
+          <a:bodyPr rtlCol="0" anchor="ctr"/>
+          <a:lstStyle/>
+          <a:p>
+            <a:pPr algn="ctr" defTabSz="872733"/>
+            <a:endParaRPr lang="en-US" sz="1500">
+              <a:solidFill>
+                <a:prstClr val="black"/>
+              </a:solidFill>
+            </a:endParaRPr>
+          </a:p>
+        </p:txBody>
+      </p:sp>
+      <p:cxnSp>
+        <p:nvCxnSpPr>
+          <p:cNvPr id="4" name="直接连接符 3">
+            <a:extLst>
+              <a:ext uri="{FF2B5EF4-FFF2-40B4-BE49-F238E27FC236}">
+                <a16:creationId xmlns:a16="http://schemas.microsoft.com/office/drawing/2014/main" id="{52ECDE16-EF18-4570-A273-7DB21E5C749C}"/>
+              </a:ext>
+            </a:extLst>
+          </p:cNvPr>
+          <p:cNvCxnSpPr>
+            <a:cxnSpLocks/>
+          </p:cNvCxnSpPr>
+          <p:nvPr/>
+        </p:nvCxnSpPr>
+        <p:spPr>
+          <a:xfrm>
+            <a:off x="4075155" y="1768980"/>
+            <a:ext cx="0" cy="225928"/>
+          </a:xfrm>
+          <a:prstGeom prst="line">
+            <a:avLst/>
+          </a:prstGeom>
+          <a:ln w="28575">
+            <a:solidFill>
+              <a:srgbClr val="FF0000"/>
+            </a:solidFill>
+          </a:ln>
+        </p:spPr>
+        <p:style>
+          <a:lnRef idx="1">
+            <a:schemeClr val="accent1"/>
+          </a:lnRef>
+          <a:fillRef idx="0">
+            <a:schemeClr val="accent1"/>
+          </a:fillRef>
+          <a:effectRef idx="0">
+            <a:schemeClr val="accent1"/>
+          </a:effectRef>
+          <a:fontRef idx="minor">
+            <a:schemeClr val="tx1"/>
+          </a:fontRef>
+        </p:style>
+      </p:cxnSp>
+      <p:sp>
+        <p:nvSpPr>
+          <p:cNvPr id="32" name="Rectangle 86">
+            <a:extLst>
+              <a:ext uri="{FF2B5EF4-FFF2-40B4-BE49-F238E27FC236}">
+                <a16:creationId xmlns:a16="http://schemas.microsoft.com/office/drawing/2014/main" id="{F9F3A688-5A8F-45E7-9858-424248A35549}"/>
+              </a:ext>
+            </a:extLst>
+          </p:cNvPr>
+          <p:cNvSpPr/>
+          <p:nvPr/>
+        </p:nvSpPr>
+        <p:spPr>
+          <a:xfrm>
+            <a:off x="1653692" y="593118"/>
+            <a:ext cx="4841139" cy="1015663"/>
+          </a:xfrm>
+          <a:prstGeom prst="rect">
+            <a:avLst/>
+          </a:prstGeom>
+          <a:gradFill rotWithShape="1">
+            <a:gsLst>
+              <a:gs pos="0">
+                <a:srgbClr val="4F81BD">
+                  <a:tint val="50000"/>
+                  <a:satMod val="300000"/>
+                </a:srgbClr>
+              </a:gs>
+              <a:gs pos="35000">
+                <a:srgbClr val="4F81BD">
+                  <a:tint val="37000"/>
+                  <a:satMod val="300000"/>
+                </a:srgbClr>
+              </a:gs>
+              <a:gs pos="100000">
+                <a:srgbClr val="4F81BD">
+                  <a:tint val="15000"/>
+                  <a:satMod val="350000"/>
+                </a:srgbClr>
+              </a:gs>
+            </a:gsLst>
+            <a:lin ang="16200000" scaled="1"/>
+          </a:gradFill>
+          <a:ln w="19050" cap="flat" cmpd="sng" algn="ctr">
+            <a:solidFill>
+              <a:srgbClr val="4F81BD">
+                <a:shade val="95000"/>
+                <a:satMod val="105000"/>
+              </a:srgbClr>
+            </a:solidFill>
+            <a:prstDash val="solid"/>
+          </a:ln>
+          <a:effectLst>
+            <a:outerShdw blurRad="40000" dist="20000" dir="5400000" rotWithShape="0">
+              <a:srgbClr val="000000">
+                <a:alpha val="38000"/>
+              </a:srgbClr>
+            </a:outerShdw>
+          </a:effectLst>
+        </p:spPr>
+        <p:txBody>
+          <a:bodyPr wrap="square" rtlCol="0" anchor="ctr">
+            <a:spAutoFit/>
+          </a:bodyPr>
+          <a:lstStyle/>
+          <a:p>
+            <a:pPr algn="ctr">
+              <a:defRPr/>
+            </a:pPr>
+            <a:r>
+              <a:rPr lang="en-US" sz="1500" kern="0" dirty="0">
+                <a:solidFill>
+                  <a:sysClr val="windowText" lastClr="000000"/>
+                </a:solidFill>
+              </a:rPr>
+              <a:t>+ execute(</a:t>
+            </a:r>
+            <a:r>
+              <a:rPr lang="en-US" altLang="zh-CN" sz="1500" dirty="0">
+                <a:solidFill>
+                  <a:prstClr val="black"/>
+                </a:solidFill>
+                <a:latin typeface="Calibri" panose="020F0502020204030204" pitchFamily="34" charset="0"/>
+                <a:cs typeface="Calibri" panose="020F0502020204030204" pitchFamily="34" charset="0"/>
+              </a:rPr>
+              <a:t>reservations: </a:t>
+            </a:r>
+            <a:r>
+              <a:rPr lang="en-US" altLang="zh-CN" sz="1500" dirty="0" err="1">
+                <a:solidFill>
+                  <a:prstClr val="black"/>
+                </a:solidFill>
+                <a:latin typeface="Calibri" panose="020F0502020204030204" pitchFamily="34" charset="0"/>
+                <a:cs typeface="Calibri" panose="020F0502020204030204" pitchFamily="34" charset="0"/>
+              </a:rPr>
+              <a:t>ReservationList</a:t>
+            </a:r>
+            <a:r>
+              <a:rPr lang="en-US" altLang="zh-CN" sz="1500" dirty="0">
+                <a:solidFill>
+                  <a:prstClr val="black"/>
+                </a:solidFill>
+                <a:latin typeface="Calibri" panose="020F0502020204030204" pitchFamily="34" charset="0"/>
+                <a:cs typeface="Calibri" panose="020F0502020204030204" pitchFamily="34" charset="0"/>
+              </a:rPr>
+              <a:t>, </a:t>
+            </a:r>
+            <a:r>
+              <a:rPr lang="en-US" altLang="zh-CN" sz="1500" dirty="0" err="1">
+                <a:solidFill>
+                  <a:prstClr val="black"/>
+                </a:solidFill>
+                <a:latin typeface="Calibri" panose="020F0502020204030204" pitchFamily="34" charset="0"/>
+                <a:cs typeface="Calibri" panose="020F0502020204030204" pitchFamily="34" charset="0"/>
+              </a:rPr>
+              <a:t>ui</a:t>
+            </a:r>
+            <a:r>
+              <a:rPr lang="en-US" altLang="zh-CN" sz="1500" dirty="0">
+                <a:solidFill>
+                  <a:prstClr val="black"/>
+                </a:solidFill>
+                <a:latin typeface="Calibri" panose="020F0502020204030204" pitchFamily="34" charset="0"/>
+                <a:cs typeface="Calibri" panose="020F0502020204030204" pitchFamily="34" charset="0"/>
+              </a:rPr>
+              <a:t>: Ui</a:t>
+            </a:r>
+            <a:r>
+              <a:rPr lang="en-US" sz="1500" kern="0" dirty="0">
+                <a:solidFill>
+                  <a:sysClr val="windowText" lastClr="000000"/>
+                </a:solidFill>
+              </a:rPr>
+              <a:t>) {abstract}</a:t>
+            </a:r>
+          </a:p>
+          <a:p>
+            <a:pPr algn="ctr">
+              <a:defRPr/>
+            </a:pPr>
+            <a:r>
+              <a:rPr lang="en-US" altLang="zh-CN" sz="1500" dirty="0">
+                <a:solidFill>
+                  <a:prstClr val="black"/>
+                </a:solidFill>
+                <a:latin typeface="Calibri" panose="020F0502020204030204" pitchFamily="34" charset="0"/>
+                <a:cs typeface="Calibri" panose="020F0502020204030204" pitchFamily="34" charset="0"/>
+              </a:rPr>
+              <a:t># </a:t>
+            </a:r>
+            <a:r>
+              <a:rPr lang="en-US" altLang="zh-CN" sz="1500" dirty="0" err="1">
+                <a:solidFill>
+                  <a:prstClr val="black"/>
+                </a:solidFill>
+                <a:latin typeface="Calibri" panose="020F0502020204030204" pitchFamily="34" charset="0"/>
+                <a:cs typeface="Calibri" panose="020F0502020204030204" pitchFamily="34" charset="0"/>
+              </a:rPr>
+              <a:t>parseInput</a:t>
+            </a:r>
+            <a:r>
+              <a:rPr lang="en-US" altLang="zh-CN" sz="1500" dirty="0">
+                <a:solidFill>
+                  <a:prstClr val="black"/>
+                </a:solidFill>
+                <a:latin typeface="Calibri" panose="020F0502020204030204" pitchFamily="34" charset="0"/>
+                <a:cs typeface="Calibri" panose="020F0502020204030204" pitchFamily="34" charset="0"/>
+              </a:rPr>
+              <a:t>(description: String)</a:t>
+            </a:r>
+            <a:r>
+              <a:rPr lang="en-US" altLang="zh-CN" sz="1500" kern="0" dirty="0">
+                <a:solidFill>
+                  <a:sysClr val="windowText" lastClr="000000"/>
+                </a:solidFill>
+                <a:latin typeface="Calibri" panose="020F0502020204030204" pitchFamily="34" charset="0"/>
+                <a:cs typeface="Calibri" panose="020F0502020204030204" pitchFamily="34" charset="0"/>
+              </a:rPr>
+              <a:t> {abstract}</a:t>
+            </a:r>
+          </a:p>
+          <a:p>
+            <a:pPr algn="ctr">
+              <a:defRPr/>
+            </a:pPr>
+            <a:r>
+              <a:rPr lang="en-US" altLang="zh-CN" sz="1500" dirty="0">
+                <a:solidFill>
+                  <a:prstClr val="black"/>
+                </a:solidFill>
+                <a:latin typeface="Calibri" panose="020F0502020204030204" pitchFamily="34" charset="0"/>
+                <a:cs typeface="Calibri" panose="020F0502020204030204" pitchFamily="34" charset="0"/>
+              </a:rPr>
+              <a:t># </a:t>
+            </a:r>
+            <a:r>
+              <a:rPr lang="en-US" altLang="zh-CN" sz="1500" dirty="0" err="1">
+                <a:solidFill>
+                  <a:prstClr val="black"/>
+                </a:solidFill>
+                <a:latin typeface="Calibri" panose="020F0502020204030204" pitchFamily="34" charset="0"/>
+                <a:cs typeface="Calibri" panose="020F0502020204030204" pitchFamily="34" charset="0"/>
+              </a:rPr>
+              <a:t>hasDelimiterInBetween</a:t>
+            </a:r>
+            <a:r>
+              <a:rPr lang="en-US" altLang="zh-CN" sz="1500" dirty="0">
+                <a:solidFill>
+                  <a:prstClr val="black"/>
+                </a:solidFill>
+                <a:latin typeface="Calibri" panose="020F0502020204030204" pitchFamily="34" charset="0"/>
+                <a:cs typeface="Calibri" panose="020F0502020204030204" pitchFamily="34" charset="0"/>
+              </a:rPr>
+              <a:t>(</a:t>
+            </a:r>
+            <a:r>
+              <a:rPr lang="en-US" altLang="zh-CN" sz="1500" dirty="0" err="1">
+                <a:solidFill>
+                  <a:prstClr val="black"/>
+                </a:solidFill>
+                <a:latin typeface="Calibri" panose="020F0502020204030204" pitchFamily="34" charset="0"/>
+                <a:cs typeface="Calibri" panose="020F0502020204030204" pitchFamily="34" charset="0"/>
+              </a:rPr>
+              <a:t>startPos</a:t>
+            </a:r>
+            <a:r>
+              <a:rPr lang="en-US" altLang="zh-CN" sz="1500" dirty="0">
+                <a:solidFill>
+                  <a:prstClr val="black"/>
+                </a:solidFill>
+                <a:latin typeface="Calibri" panose="020F0502020204030204" pitchFamily="34" charset="0"/>
+                <a:cs typeface="Calibri" panose="020F0502020204030204" pitchFamily="34" charset="0"/>
+              </a:rPr>
+              <a:t>: Integer, </a:t>
+            </a:r>
+            <a:r>
+              <a:rPr lang="en-US" altLang="zh-CN" sz="1500" dirty="0" err="1">
+                <a:solidFill>
+                  <a:prstClr val="black"/>
+                </a:solidFill>
+                <a:latin typeface="Calibri" panose="020F0502020204030204" pitchFamily="34" charset="0"/>
+                <a:cs typeface="Calibri" panose="020F0502020204030204" pitchFamily="34" charset="0"/>
+              </a:rPr>
+              <a:t>endPos</a:t>
+            </a:r>
+            <a:r>
+              <a:rPr lang="en-US" altLang="zh-CN" sz="1500" dirty="0">
+                <a:solidFill>
+                  <a:prstClr val="black"/>
+                </a:solidFill>
+                <a:latin typeface="Calibri" panose="020F0502020204030204" pitchFamily="34" charset="0"/>
+                <a:cs typeface="Calibri" panose="020F0502020204030204" pitchFamily="34" charset="0"/>
+              </a:rPr>
+              <a:t>: Integer, markers: String[], description: String): Boolean</a:t>
+            </a:r>
           </a:p>
         </p:txBody>
       </p:sp>

</xml_diff>

<commit_message>
Update diagram in DG
</commit_message>
<xml_diff>
--- a/docs/UML reference sheet.pptx
+++ b/docs/UML reference sheet.pptx
@@ -215,7 +215,7 @@
           <a:p>
             <a:fld id="{9629A0FB-7277-41B0-BEC2-EE35F8B0CE39}" type="datetimeFigureOut">
               <a:rPr lang="en-SG" smtClean="0"/>
-              <a:t>30/3/20</a:t>
+              <a:t>31/3/20</a:t>
             </a:fld>
             <a:endParaRPr lang="en-SG"/>
           </a:p>
@@ -11513,8 +11513,8 @@
         </p:nvSpPr>
         <p:spPr bwMode="auto">
           <a:xfrm flipH="1">
-            <a:off x="3847068" y="2779556"/>
-            <a:ext cx="13402" cy="3088061"/>
+            <a:off x="3845245" y="2779556"/>
+            <a:ext cx="15225" cy="3508187"/>
           </a:xfrm>
           <a:prstGeom prst="line">
             <a:avLst/>
@@ -11846,7 +11846,7 @@
         </p:nvSpPr>
         <p:spPr bwMode="auto">
           <a:xfrm flipH="1">
-            <a:off x="1058695" y="5544711"/>
+            <a:off x="1099464" y="6022503"/>
             <a:ext cx="5088796" cy="2828"/>
           </a:xfrm>
           <a:prstGeom prst="line">
@@ -12042,8 +12042,8 @@
         </p:nvSpPr>
         <p:spPr bwMode="auto">
           <a:xfrm flipH="1">
-            <a:off x="7895582" y="2890771"/>
-            <a:ext cx="18856" cy="3197374"/>
+            <a:off x="7914436" y="2890771"/>
+            <a:ext cx="1" cy="3425958"/>
           </a:xfrm>
           <a:prstGeom prst="line">
             <a:avLst/>
@@ -12132,14 +12132,18 @@
             <a:r>
               <a:rPr lang="en-US" i="1" dirty="0" err="1">
                 <a:solidFill>
-                  <a:srgbClr val="B8CF8B"/>
+                  <a:schemeClr val="accent3">
+                    <a:lumMod val="75000"/>
+                  </a:schemeClr>
                 </a:solidFill>
               </a:rPr>
               <a:t>AddToSemCommand</a:t>
             </a:r>
             <a:endParaRPr lang="en-US" i="1" dirty="0">
               <a:solidFill>
-                <a:srgbClr val="B8CF8B"/>
+                <a:schemeClr val="accent3">
+                  <a:lumMod val="75000"/>
+                </a:schemeClr>
               </a:solidFill>
             </a:endParaRPr>
           </a:p>
@@ -12369,7 +12373,7 @@
         </p:nvGrpSpPr>
         <p:grpSpPr>
           <a:xfrm>
-            <a:off x="3915045" y="3369673"/>
+            <a:off x="3962400" y="3352800"/>
             <a:ext cx="139004" cy="105947"/>
             <a:chOff x="2660072" y="4394662"/>
             <a:chExt cx="276298" cy="210590"/>
@@ -12523,7 +12527,7 @@
         </p:nvSpPr>
         <p:spPr bwMode="auto">
           <a:xfrm>
-            <a:off x="3982995" y="3244334"/>
+            <a:off x="3869108" y="3187666"/>
             <a:ext cx="1198605" cy="184666"/>
           </a:xfrm>
           <a:prstGeom prst="rect">
@@ -12609,7 +12613,7 @@
         </p:nvSpPr>
         <p:spPr bwMode="auto">
           <a:xfrm>
-            <a:off x="3928128" y="3990819"/>
+            <a:off x="3920870" y="3950160"/>
             <a:ext cx="2486721" cy="215444"/>
           </a:xfrm>
           <a:prstGeom prst="rect">
@@ -12639,14 +12643,18 @@
             <a:r>
               <a:rPr lang="en-US" sz="800" i="1" dirty="0" err="1">
                 <a:solidFill>
-                  <a:srgbClr val="B8CF8B"/>
+                  <a:schemeClr val="accent3">
+                    <a:lumMod val="75000"/>
+                  </a:schemeClr>
                 </a:solidFill>
               </a:rPr>
               <a:t>AddToSemCommand</a:t>
             </a:r>
             <a:endParaRPr lang="en-US" sz="800" i="1" dirty="0">
               <a:solidFill>
-                <a:srgbClr val="B8CF8B"/>
+                <a:schemeClr val="accent3">
+                  <a:lumMod val="75000"/>
+                </a:schemeClr>
               </a:solidFill>
             </a:endParaRPr>
           </a:p>
@@ -12668,8 +12676,8 @@
         </p:nvSpPr>
         <p:spPr bwMode="auto">
           <a:xfrm>
-            <a:off x="3993235" y="3505200"/>
-            <a:ext cx="1038416" cy="18123"/>
+            <a:off x="3993235" y="3505201"/>
+            <a:ext cx="1056536" cy="4868"/>
           </a:xfrm>
           <a:prstGeom prst="line">
             <a:avLst/>
@@ -12677,7 +12685,9 @@
           <a:noFill/>
           <a:ln w="19050">
             <a:solidFill>
-              <a:srgbClr val="7030A0"/>
+              <a:schemeClr val="accent3">
+                <a:lumMod val="75000"/>
+              </a:schemeClr>
             </a:solidFill>
             <a:round/>
             <a:headEnd/>
@@ -12713,8 +12723,8 @@
         </p:nvSpPr>
         <p:spPr bwMode="auto">
           <a:xfrm>
-            <a:off x="4316764" y="3352800"/>
-            <a:ext cx="1068449" cy="215444"/>
+            <a:off x="3961724" y="3518356"/>
+            <a:ext cx="1204022" cy="215444"/>
           </a:xfrm>
           <a:prstGeom prst="rect">
             <a:avLst/>
@@ -12741,13 +12751,32 @@
               <a:buNone/>
             </a:pPr>
             <a:r>
-              <a:rPr lang="en-US" sz="800" i="1" dirty="0">
-                <a:solidFill>
-                  <a:srgbClr val="7030A0"/>
+              <a:rPr lang="en-US" sz="800" i="1" dirty="0" err="1">
+                <a:solidFill>
+                  <a:schemeClr val="accent3">
+                    <a:lumMod val="75000"/>
+                  </a:schemeClr>
                 </a:solidFill>
               </a:rPr>
-              <a:t>create</a:t>
-            </a:r>
+              <a:t>AddToSemCommand</a:t>
+            </a:r>
+            <a:r>
+              <a:rPr lang="en-US" altLang="zh-CN" sz="800" i="1" dirty="0">
+                <a:solidFill>
+                  <a:schemeClr val="accent3">
+                    <a:lumMod val="75000"/>
+                  </a:schemeClr>
+                </a:solidFill>
+              </a:rPr>
+              <a:t>()</a:t>
+            </a:r>
+            <a:endParaRPr lang="en-US" sz="800" i="1" dirty="0">
+              <a:solidFill>
+                <a:schemeClr val="accent3">
+                  <a:lumMod val="75000"/>
+                </a:schemeClr>
+              </a:solidFill>
+            </a:endParaRPr>
           </a:p>
         </p:txBody>
       </p:sp>
@@ -12765,7 +12794,7 @@
         </p:nvSpPr>
         <p:spPr>
           <a:xfrm>
-            <a:off x="6052013" y="3687180"/>
+            <a:off x="6052013" y="3697083"/>
             <a:ext cx="285825" cy="240258"/>
           </a:xfrm>
           <a:prstGeom prst="rect">
@@ -13729,7 +13758,9 @@
             <a:r>
               <a:rPr lang="en-US" sz="800" i="1" dirty="0" err="1">
                 <a:solidFill>
-                  <a:srgbClr val="B8CF8B"/>
+                  <a:schemeClr val="accent3">
+                    <a:lumMod val="75000"/>
+                  </a:schemeClr>
                 </a:solidFill>
               </a:rPr>
               <a:t>showAddedToSemMessage</a:t>
@@ -13737,7 +13768,9 @@
             <a:r>
               <a:rPr lang="en-US" sz="800" dirty="0">
                 <a:solidFill>
-                  <a:srgbClr val="B8CF8B"/>
+                  <a:schemeClr val="accent3">
+                    <a:lumMod val="75000"/>
+                  </a:schemeClr>
                 </a:solidFill>
               </a:rPr>
               <a:t>()</a:t>

</xml_diff>

<commit_message>
Fix bugs in DG's graph showing
</commit_message>
<xml_diff>
--- a/docs/UML reference sheet.pptx
+++ b/docs/UML reference sheet.pptx
@@ -215,7 +215,7 @@
           <a:p>
             <a:fld id="{9629A0FB-7277-41B0-BEC2-EE35F8B0CE39}" type="datetimeFigureOut">
               <a:rPr lang="en-SG" smtClean="0"/>
-              <a:t>31/3/20</a:t>
+              <a:t>9/4/20</a:t>
             </a:fld>
             <a:endParaRPr lang="en-SG"/>
           </a:p>
@@ -12897,62 +12897,6 @@
       </p:sp>
       <p:sp>
         <p:nvSpPr>
-          <p:cNvPr id="91" name="Text Box 25">
-            <a:extLst>
-              <a:ext uri="{FF2B5EF4-FFF2-40B4-BE49-F238E27FC236}">
-                <a16:creationId xmlns:a16="http://schemas.microsoft.com/office/drawing/2014/main" id="{D0BB4C59-A1DA-FB41-9F46-DB0D140F7D56}"/>
-              </a:ext>
-            </a:extLst>
-          </p:cNvPr>
-          <p:cNvSpPr txBox="1">
-            <a:spLocks noChangeArrowheads="1"/>
-          </p:cNvSpPr>
-          <p:nvPr/>
-        </p:nvSpPr>
-        <p:spPr bwMode="auto">
-          <a:xfrm>
-            <a:off x="4445341" y="3735866"/>
-            <a:ext cx="1222871" cy="261610"/>
-          </a:xfrm>
-          <a:prstGeom prst="rect">
-            <a:avLst/>
-          </a:prstGeom>
-          <a:noFill/>
-          <a:ln w="12700" algn="ctr">
-            <a:noFill/>
-            <a:miter lim="800000"/>
-            <a:headEnd/>
-            <a:tailEnd/>
-          </a:ln>
-        </p:spPr>
-        <p:txBody>
-          <a:bodyPr wrap="square">
-            <a:spAutoFit/>
-          </a:bodyPr>
-          <a:lstStyle/>
-          <a:p>
-            <a:pPr defTabSz="872733">
-              <a:spcBef>
-                <a:spcPct val="50000"/>
-              </a:spcBef>
-              <a:buFont typeface="Wingdings" pitchFamily="2" charset="2"/>
-              <a:buNone/>
-            </a:pPr>
-            <a:r>
-              <a:rPr lang="en-US" sz="1100" i="1" dirty="0">
-                <a:solidFill>
-                  <a:srgbClr val="9BBB59">
-                    <a:lumMod val="75000"/>
-                  </a:srgbClr>
-                </a:solidFill>
-              </a:rPr>
-              <a:t>return value</a:t>
-            </a:r>
-          </a:p>
-        </p:txBody>
-      </p:sp>
-      <p:sp>
-        <p:nvSpPr>
           <p:cNvPr id="92" name="Line 16">
             <a:extLst>
               <a:ext uri="{FF2B5EF4-FFF2-40B4-BE49-F238E27FC236}">
@@ -13484,72 +13428,6 @@
       </p:sp>
       <p:sp>
         <p:nvSpPr>
-          <p:cNvPr id="113" name="Text Box 25">
-            <a:extLst>
-              <a:ext uri="{FF2B5EF4-FFF2-40B4-BE49-F238E27FC236}">
-                <a16:creationId xmlns:a16="http://schemas.microsoft.com/office/drawing/2014/main" id="{8975E4C8-C7DB-454B-924C-E3EB13F8AE26}"/>
-              </a:ext>
-            </a:extLst>
-          </p:cNvPr>
-          <p:cNvSpPr txBox="1">
-            <a:spLocks noChangeArrowheads="1"/>
-          </p:cNvSpPr>
-          <p:nvPr/>
-        </p:nvSpPr>
-        <p:spPr bwMode="auto">
-          <a:xfrm>
-            <a:off x="6421395" y="4599801"/>
-            <a:ext cx="1198605" cy="276999"/>
-          </a:xfrm>
-          <a:prstGeom prst="rect">
-            <a:avLst/>
-          </a:prstGeom>
-          <a:noFill/>
-          <a:ln w="12700" algn="ctr">
-            <a:noFill/>
-            <a:miter lim="800000"/>
-            <a:headEnd/>
-            <a:tailEnd/>
-          </a:ln>
-        </p:spPr>
-        <p:txBody>
-          <a:bodyPr wrap="square">
-            <a:spAutoFit/>
-          </a:bodyPr>
-          <a:lstStyle/>
-          <a:p>
-            <a:pPr defTabSz="872733">
-              <a:spcBef>
-                <a:spcPct val="50000"/>
-              </a:spcBef>
-              <a:buFont typeface="Wingdings" pitchFamily="2" charset="2"/>
-              <a:buNone/>
-            </a:pPr>
-            <a:r>
-              <a:rPr lang="en-US" sz="1200" i="1" dirty="0" err="1">
-                <a:solidFill>
-                  <a:srgbClr val="9BBB59">
-                    <a:lumMod val="75000"/>
-                  </a:srgbClr>
-                </a:solidFill>
-              </a:rPr>
-              <a:t>addModule</a:t>
-            </a:r>
-            <a:r>
-              <a:rPr lang="en-US" sz="1200" i="1" dirty="0">
-                <a:solidFill>
-                  <a:srgbClr val="9BBB59">
-                    <a:lumMod val="75000"/>
-                  </a:srgbClr>
-                </a:solidFill>
-              </a:rPr>
-              <a:t>()</a:t>
-            </a:r>
-          </a:p>
-        </p:txBody>
-      </p:sp>
-      <p:sp>
-        <p:nvSpPr>
           <p:cNvPr id="114" name="Text Box 11">
             <a:extLst>
               <a:ext uri="{FF2B5EF4-FFF2-40B4-BE49-F238E27FC236}">
@@ -13687,8 +13565,8 @@
         </p:nvSpPr>
         <p:spPr>
           <a:xfrm>
-            <a:off x="7766051" y="5791200"/>
-            <a:ext cx="285826" cy="227713"/>
+            <a:off x="7766051" y="5791201"/>
+            <a:ext cx="285826" cy="138954"/>
           </a:xfrm>
           <a:prstGeom prst="rect">
             <a:avLst/>
@@ -14208,6 +14086,54 @@
                 <a:srgbClr val="9BBB59">
                   <a:lumMod val="75000"/>
                 </a:srgbClr>
+              </a:solidFill>
+            </a:endParaRPr>
+          </a:p>
+        </p:txBody>
+      </p:sp>
+      <p:sp>
+        <p:nvSpPr>
+          <p:cNvPr id="65" name="Line 16">
+            <a:extLst>
+              <a:ext uri="{FF2B5EF4-FFF2-40B4-BE49-F238E27FC236}">
+                <a16:creationId xmlns:a16="http://schemas.microsoft.com/office/drawing/2014/main" id="{0737385E-4C90-E445-9377-AEFF1E1F5832}"/>
+              </a:ext>
+            </a:extLst>
+          </p:cNvPr>
+          <p:cNvSpPr>
+            <a:spLocks noChangeShapeType="1"/>
+          </p:cNvSpPr>
+          <p:nvPr/>
+        </p:nvSpPr>
+        <p:spPr bwMode="auto">
+          <a:xfrm flipH="1">
+            <a:off x="6379484" y="5943600"/>
+            <a:ext cx="1427627" cy="0"/>
+          </a:xfrm>
+          <a:prstGeom prst="line">
+            <a:avLst/>
+          </a:prstGeom>
+          <a:noFill/>
+          <a:ln w="19050">
+            <a:solidFill>
+              <a:schemeClr val="accent3">
+                <a:lumMod val="75000"/>
+              </a:schemeClr>
+            </a:solidFill>
+            <a:prstDash val="sysDash"/>
+            <a:round/>
+            <a:headEnd/>
+            <a:tailEnd type="triangle" w="lg" len="lg"/>
+          </a:ln>
+        </p:spPr>
+        <p:txBody>
+          <a:bodyPr/>
+          <a:lstStyle/>
+          <a:p>
+            <a:pPr defTabSz="872733"/>
+            <a:endParaRPr lang="en-US" sz="2000">
+              <a:solidFill>
+                <a:prstClr val="black"/>
               </a:solidFill>
             </a:endParaRPr>
           </a:p>

</xml_diff>